<commit_message>
Making lecture 5 and quiz 1
Deleted node_modules. That may cause a mess later.
</commit_message>
<xml_diff>
--- a/Lectures/Lecture 5 MCMC.pptx
+++ b/Lectures/Lecture 5 MCMC.pptx
@@ -5,7 +5,7 @@
     <p:sldMasterId id="2147483648" r:id="rId1"/>
   </p:sldMasterIdLst>
   <p:notesMasterIdLst>
-    <p:notesMasterId r:id="rId25"/>
+    <p:notesMasterId r:id="rId27"/>
   </p:notesMasterIdLst>
   <p:sldIdLst>
     <p:sldId id="256" r:id="rId2"/>
@@ -31,6 +31,8 @@
     <p:sldId id="372" r:id="rId22"/>
     <p:sldId id="373" r:id="rId23"/>
     <p:sldId id="643" r:id="rId24"/>
+    <p:sldId id="644" r:id="rId25"/>
+    <p:sldId id="645" r:id="rId26"/>
   </p:sldIdLst>
   <p:sldSz cx="12192000" cy="6858000"/>
   <p:notesSz cx="6858000" cy="9144000"/>
@@ -940,7 +942,7 @@
           <a:p>
             <a:fld id="{9CF176CD-15D1-4787-BBAA-B7F61FF9E394}" type="datetimeFigureOut">
               <a:rPr lang="en-GB" smtClean="0"/>
-              <a:t>16/03/2025</a:t>
+              <a:t>17/03/2025</a:t>
             </a:fld>
             <a:endParaRPr lang="en-GB"/>
           </a:p>
@@ -1339,7 +1341,7 @@
           <a:p>
             <a:fld id="{633AF1EE-65BA-4140-B6B9-7F82C437F84A}" type="datetimeFigureOut">
               <a:rPr lang="en-GB" smtClean="0"/>
-              <a:t>16/03/2025</a:t>
+              <a:t>17/03/2025</a:t>
             </a:fld>
             <a:endParaRPr lang="en-GB"/>
           </a:p>
@@ -1509,7 +1511,7 @@
           <a:p>
             <a:fld id="{633AF1EE-65BA-4140-B6B9-7F82C437F84A}" type="datetimeFigureOut">
               <a:rPr lang="en-GB" smtClean="0"/>
-              <a:t>16/03/2025</a:t>
+              <a:t>17/03/2025</a:t>
             </a:fld>
             <a:endParaRPr lang="en-GB"/>
           </a:p>
@@ -1689,7 +1691,7 @@
           <a:p>
             <a:fld id="{633AF1EE-65BA-4140-B6B9-7F82C437F84A}" type="datetimeFigureOut">
               <a:rPr lang="en-GB" smtClean="0"/>
-              <a:t>16/03/2025</a:t>
+              <a:t>17/03/2025</a:t>
             </a:fld>
             <a:endParaRPr lang="en-GB"/>
           </a:p>
@@ -1859,7 +1861,7 @@
           <a:p>
             <a:fld id="{633AF1EE-65BA-4140-B6B9-7F82C437F84A}" type="datetimeFigureOut">
               <a:rPr lang="en-GB" smtClean="0"/>
-              <a:t>16/03/2025</a:t>
+              <a:t>17/03/2025</a:t>
             </a:fld>
             <a:endParaRPr lang="en-GB"/>
           </a:p>
@@ -2105,7 +2107,7 @@
           <a:p>
             <a:fld id="{633AF1EE-65BA-4140-B6B9-7F82C437F84A}" type="datetimeFigureOut">
               <a:rPr lang="en-GB" smtClean="0"/>
-              <a:t>16/03/2025</a:t>
+              <a:t>17/03/2025</a:t>
             </a:fld>
             <a:endParaRPr lang="en-GB"/>
           </a:p>
@@ -2337,7 +2339,7 @@
           <a:p>
             <a:fld id="{633AF1EE-65BA-4140-B6B9-7F82C437F84A}" type="datetimeFigureOut">
               <a:rPr lang="en-GB" smtClean="0"/>
-              <a:t>16/03/2025</a:t>
+              <a:t>17/03/2025</a:t>
             </a:fld>
             <a:endParaRPr lang="en-GB"/>
           </a:p>
@@ -2704,7 +2706,7 @@
           <a:p>
             <a:fld id="{633AF1EE-65BA-4140-B6B9-7F82C437F84A}" type="datetimeFigureOut">
               <a:rPr lang="en-GB" smtClean="0"/>
-              <a:t>16/03/2025</a:t>
+              <a:t>17/03/2025</a:t>
             </a:fld>
             <a:endParaRPr lang="en-GB"/>
           </a:p>
@@ -2822,7 +2824,7 @@
           <a:p>
             <a:fld id="{633AF1EE-65BA-4140-B6B9-7F82C437F84A}" type="datetimeFigureOut">
               <a:rPr lang="en-GB" smtClean="0"/>
-              <a:t>16/03/2025</a:t>
+              <a:t>17/03/2025</a:t>
             </a:fld>
             <a:endParaRPr lang="en-GB"/>
           </a:p>
@@ -2917,7 +2919,7 @@
           <a:p>
             <a:fld id="{633AF1EE-65BA-4140-B6B9-7F82C437F84A}" type="datetimeFigureOut">
               <a:rPr lang="en-GB" smtClean="0"/>
-              <a:t>16/03/2025</a:t>
+              <a:t>17/03/2025</a:t>
             </a:fld>
             <a:endParaRPr lang="en-GB"/>
           </a:p>
@@ -3194,7 +3196,7 @@
           <a:p>
             <a:fld id="{633AF1EE-65BA-4140-B6B9-7F82C437F84A}" type="datetimeFigureOut">
               <a:rPr lang="en-GB" smtClean="0"/>
-              <a:t>16/03/2025</a:t>
+              <a:t>17/03/2025</a:t>
             </a:fld>
             <a:endParaRPr lang="en-GB"/>
           </a:p>
@@ -3447,7 +3449,7 @@
           <a:p>
             <a:fld id="{633AF1EE-65BA-4140-B6B9-7F82C437F84A}" type="datetimeFigureOut">
               <a:rPr lang="en-GB" smtClean="0"/>
-              <a:t>16/03/2025</a:t>
+              <a:t>17/03/2025</a:t>
             </a:fld>
             <a:endParaRPr lang="en-GB"/>
           </a:p>
@@ -3660,7 +3662,7 @@
           <a:p>
             <a:fld id="{633AF1EE-65BA-4140-B6B9-7F82C437F84A}" type="datetimeFigureOut">
               <a:rPr lang="en-GB" smtClean="0"/>
-              <a:t>16/03/2025</a:t>
+              <a:t>17/03/2025</a:t>
             </a:fld>
             <a:endParaRPr lang="en-GB"/>
           </a:p>
@@ -9439,8 +9441,8 @@
           </a:p>
         </p:txBody>
       </p:sp>
-      <mc:AlternateContent xmlns:mc="http://schemas.openxmlformats.org/markup-compatibility/2006">
-        <mc:Choice xmlns:a14="http://schemas.microsoft.com/office/drawing/2010/main" Requires="a14">
+      <mc:AlternateContent xmlns:mc="http://schemas.openxmlformats.org/markup-compatibility/2006" xmlns:a14="http://schemas.microsoft.com/office/drawing/2010/main">
+        <mc:Choice Requires="a14">
           <p:sp>
             <p:nvSpPr>
               <p:cNvPr id="3" name="Content Placeholder 2">
@@ -9514,7 +9516,7 @@
             </p:txBody>
           </p:sp>
         </mc:Choice>
-        <mc:Fallback>
+        <mc:Fallback xmlns="">
           <p:sp>
             <p:nvSpPr>
               <p:cNvPr id="3" name="Content Placeholder 2">
@@ -12711,8 +12713,8 @@
           </a:p>
         </p:txBody>
       </p:sp>
-      <mc:AlternateContent xmlns:mc="http://schemas.openxmlformats.org/markup-compatibility/2006">
-        <mc:Choice xmlns:a14="http://schemas.microsoft.com/office/drawing/2010/main" Requires="a14">
+      <mc:AlternateContent xmlns:mc="http://schemas.openxmlformats.org/markup-compatibility/2006" xmlns:a14="http://schemas.microsoft.com/office/drawing/2010/main">
+        <mc:Choice Requires="a14">
           <p:sp>
             <p:nvSpPr>
               <p:cNvPr id="4" name="Content Placeholder 3">
@@ -12800,7 +12802,7 @@
             </p:txBody>
           </p:sp>
         </mc:Choice>
-        <mc:Fallback>
+        <mc:Fallback xmlns="">
           <p:sp>
             <p:nvSpPr>
               <p:cNvPr id="4" name="Content Placeholder 3">
@@ -12874,6 +12876,270 @@
     <p:extLst>
       <p:ext uri="{BB962C8B-B14F-4D97-AF65-F5344CB8AC3E}">
         <p14:creationId xmlns:p14="http://schemas.microsoft.com/office/powerpoint/2010/main" val="1789157295"/>
+      </p:ext>
+    </p:extLst>
+  </p:cSld>
+  <p:clrMapOvr>
+    <a:masterClrMapping/>
+  </p:clrMapOvr>
+</p:sld>
+</file>
+
+<file path=ppt/slides/slide24.xml><?xml version="1.0" encoding="utf-8"?>
+<p:sld xmlns:a="http://schemas.openxmlformats.org/drawingml/2006/main" xmlns:r="http://schemas.openxmlformats.org/officeDocument/2006/relationships" xmlns:p="http://schemas.openxmlformats.org/presentationml/2006/main">
+  <p:cSld>
+    <p:spTree>
+      <p:nvGrpSpPr>
+        <p:cNvPr id="1" name="">
+          <a:extLst>
+            <a:ext uri="{FF2B5EF4-FFF2-40B4-BE49-F238E27FC236}">
+              <a16:creationId xmlns:a16="http://schemas.microsoft.com/office/drawing/2014/main" id="{9295E71F-199B-7B98-3C9A-34613621AD46}"/>
+            </a:ext>
+          </a:extLst>
+        </p:cNvPr>
+        <p:cNvGrpSpPr/>
+        <p:nvPr/>
+      </p:nvGrpSpPr>
+      <p:grpSpPr>
+        <a:xfrm>
+          <a:off x="0" y="0"/>
+          <a:ext cx="0" cy="0"/>
+          <a:chOff x="0" y="0"/>
+          <a:chExt cx="0" cy="0"/>
+        </a:xfrm>
+      </p:grpSpPr>
+      <p:sp>
+        <p:nvSpPr>
+          <p:cNvPr id="6" name="Title 5">
+            <a:extLst>
+              <a:ext uri="{FF2B5EF4-FFF2-40B4-BE49-F238E27FC236}">
+                <a16:creationId xmlns:a16="http://schemas.microsoft.com/office/drawing/2014/main" id="{0F4CB416-EB81-A472-34AC-77A1B53F9EBD}"/>
+              </a:ext>
+            </a:extLst>
+          </p:cNvPr>
+          <p:cNvSpPr>
+            <a:spLocks noGrp="1"/>
+          </p:cNvSpPr>
+          <p:nvPr>
+            <p:ph type="title"/>
+          </p:nvPr>
+        </p:nvSpPr>
+        <p:spPr/>
+        <p:txBody>
+          <a:bodyPr/>
+          <a:lstStyle/>
+          <a:p>
+            <a:endParaRPr lang="en-IL"/>
+          </a:p>
+        </p:txBody>
+      </p:sp>
+      <p:sp>
+        <p:nvSpPr>
+          <p:cNvPr id="7" name="Text Placeholder 6">
+            <a:extLst>
+              <a:ext uri="{FF2B5EF4-FFF2-40B4-BE49-F238E27FC236}">
+                <a16:creationId xmlns:a16="http://schemas.microsoft.com/office/drawing/2014/main" id="{29928445-0A73-C858-B693-9D666487A9C3}"/>
+              </a:ext>
+            </a:extLst>
+          </p:cNvPr>
+          <p:cNvSpPr>
+            <a:spLocks noGrp="1"/>
+          </p:cNvSpPr>
+          <p:nvPr>
+            <p:ph type="body" idx="1"/>
+          </p:nvPr>
+        </p:nvSpPr>
+        <p:spPr/>
+        <p:txBody>
+          <a:bodyPr>
+            <a:normAutofit fontScale="92500"/>
+          </a:bodyPr>
+          <a:lstStyle/>
+          <a:p>
+            <a:pPr algn="ctr"/>
+            <a:r>
+              <a:rPr lang="en-US" sz="7200" dirty="0"/>
+              <a:t>5E Quadratic approximations</a:t>
+            </a:r>
+            <a:endParaRPr lang="en-IL" sz="7200" dirty="0"/>
+          </a:p>
+        </p:txBody>
+      </p:sp>
+      <p:sp>
+        <p:nvSpPr>
+          <p:cNvPr id="4" name="Footer Placeholder 3">
+            <a:extLst>
+              <a:ext uri="{FF2B5EF4-FFF2-40B4-BE49-F238E27FC236}">
+                <a16:creationId xmlns:a16="http://schemas.microsoft.com/office/drawing/2014/main" id="{A5137422-F805-A09C-D6AB-771696DB3079}"/>
+              </a:ext>
+            </a:extLst>
+          </p:cNvPr>
+          <p:cNvSpPr>
+            <a:spLocks noGrp="1"/>
+          </p:cNvSpPr>
+          <p:nvPr>
+            <p:ph type="ftr" sz="quarter" idx="11"/>
+          </p:nvPr>
+        </p:nvSpPr>
+        <p:spPr/>
+        <p:txBody>
+          <a:bodyPr/>
+          <a:lstStyle/>
+          <a:p>
+            <a:pPr>
+              <a:defRPr/>
+            </a:pPr>
+            <a:r>
+              <a:rPr lang="en-US"/>
+              <a:t>Data analysis, 2022-1, Lecture 1</a:t>
+            </a:r>
+          </a:p>
+        </p:txBody>
+      </p:sp>
+      <p:sp>
+        <p:nvSpPr>
+          <p:cNvPr id="5" name="Slide Number Placeholder 4">
+            <a:extLst>
+              <a:ext uri="{FF2B5EF4-FFF2-40B4-BE49-F238E27FC236}">
+                <a16:creationId xmlns:a16="http://schemas.microsoft.com/office/drawing/2014/main" id="{03488D1E-43C6-1A15-2B35-E7E6E256B62C}"/>
+              </a:ext>
+            </a:extLst>
+          </p:cNvPr>
+          <p:cNvSpPr>
+            <a:spLocks noGrp="1"/>
+          </p:cNvSpPr>
+          <p:nvPr>
+            <p:ph type="sldNum" sz="quarter" idx="12"/>
+          </p:nvPr>
+        </p:nvSpPr>
+        <p:spPr/>
+        <p:txBody>
+          <a:bodyPr/>
+          <a:lstStyle/>
+          <a:p>
+            <a:pPr>
+              <a:defRPr/>
+            </a:pPr>
+            <a:fld id="{3469EAC8-EFAD-49DA-A425-6225312A328A}" type="slidenum">
+              <a:rPr lang="he-IL" altLang="en-US" smtClean="0"/>
+              <a:pPr>
+                <a:defRPr/>
+              </a:pPr>
+              <a:t>24</a:t>
+            </a:fld>
+            <a:r>
+              <a:rPr lang="en-US" altLang="en-US"/>
+              <a:t> /  72</a:t>
+            </a:r>
+          </a:p>
+        </p:txBody>
+      </p:sp>
+    </p:spTree>
+    <p:extLst>
+      <p:ext uri="{BB962C8B-B14F-4D97-AF65-F5344CB8AC3E}">
+        <p14:creationId xmlns:p14="http://schemas.microsoft.com/office/powerpoint/2010/main" val="1943740067"/>
+      </p:ext>
+    </p:extLst>
+  </p:cSld>
+  <p:clrMapOvr>
+    <a:masterClrMapping/>
+  </p:clrMapOvr>
+</p:sld>
+</file>
+
+<file path=ppt/slides/slide25.xml><?xml version="1.0" encoding="utf-8"?>
+<p:sld xmlns:a="http://schemas.openxmlformats.org/drawingml/2006/main" xmlns:r="http://schemas.openxmlformats.org/officeDocument/2006/relationships" xmlns:p="http://schemas.openxmlformats.org/presentationml/2006/main">
+  <p:cSld>
+    <p:spTree>
+      <p:nvGrpSpPr>
+        <p:cNvPr id="1" name=""/>
+        <p:cNvGrpSpPr/>
+        <p:nvPr/>
+      </p:nvGrpSpPr>
+      <p:grpSpPr>
+        <a:xfrm>
+          <a:off x="0" y="0"/>
+          <a:ext cx="0" cy="0"/>
+          <a:chOff x="0" y="0"/>
+          <a:chExt cx="0" cy="0"/>
+        </a:xfrm>
+      </p:grpSpPr>
+      <p:sp>
+        <p:nvSpPr>
+          <p:cNvPr id="4" name="Title 3">
+            <a:extLst>
+              <a:ext uri="{FF2B5EF4-FFF2-40B4-BE49-F238E27FC236}">
+                <a16:creationId xmlns:a16="http://schemas.microsoft.com/office/drawing/2014/main" id="{05197DDA-F26B-EB35-E2BD-81855B89FF7A}"/>
+              </a:ext>
+            </a:extLst>
+          </p:cNvPr>
+          <p:cNvSpPr>
+            <a:spLocks noGrp="1"/>
+          </p:cNvSpPr>
+          <p:nvPr>
+            <p:ph type="title"/>
+          </p:nvPr>
+        </p:nvSpPr>
+        <p:spPr/>
+        <p:txBody>
+          <a:bodyPr/>
+          <a:lstStyle/>
+          <a:p>
+            <a:r>
+              <a:rPr lang="en-US" dirty="0"/>
+              <a:t>Sample from something easier</a:t>
+            </a:r>
+            <a:endParaRPr lang="he-IL" dirty="0"/>
+          </a:p>
+        </p:txBody>
+      </p:sp>
+      <p:sp>
+        <p:nvSpPr>
+          <p:cNvPr id="5" name="Content Placeholder 4">
+            <a:extLst>
+              <a:ext uri="{FF2B5EF4-FFF2-40B4-BE49-F238E27FC236}">
+                <a16:creationId xmlns:a16="http://schemas.microsoft.com/office/drawing/2014/main" id="{7154B155-8A36-7722-7FB9-27183BC21398}"/>
+              </a:ext>
+            </a:extLst>
+          </p:cNvPr>
+          <p:cNvSpPr>
+            <a:spLocks noGrp="1"/>
+          </p:cNvSpPr>
+          <p:nvPr>
+            <p:ph idx="1"/>
+          </p:nvPr>
+        </p:nvSpPr>
+        <p:spPr/>
+        <p:txBody>
+          <a:bodyPr/>
+          <a:lstStyle/>
+          <a:p>
+            <a:r>
+              <a:rPr lang="en-US" dirty="0"/>
+              <a:t>We want to sample from the posterior</a:t>
+            </a:r>
+          </a:p>
+          <a:p>
+            <a:r>
+              <a:rPr lang="en-US"/>
+              <a:t>Instead, </a:t>
+            </a:r>
+            <a:r>
+              <a:rPr lang="en-US" dirty="0"/>
+              <a:t>we can sample from </a:t>
+            </a:r>
+            <a:r>
+              <a:rPr lang="en-US"/>
+              <a:t>an approximation</a:t>
+            </a:r>
+            <a:endParaRPr lang="he-IL" dirty="0"/>
+          </a:p>
+        </p:txBody>
+      </p:sp>
+    </p:spTree>
+    <p:extLst>
+      <p:ext uri="{BB962C8B-B14F-4D97-AF65-F5344CB8AC3E}">
+        <p14:creationId xmlns:p14="http://schemas.microsoft.com/office/powerpoint/2010/main" val="3419487548"/>
       </p:ext>
     </p:extLst>
   </p:cSld>

</xml_diff>

<commit_message>
Getting back to work
</commit_message>
<xml_diff>
--- a/Lectures/Lecture 5 MCMC.pptx
+++ b/Lectures/Lecture 5 MCMC.pptx
@@ -5,34 +5,35 @@
     <p:sldMasterId id="2147483648" r:id="rId1"/>
   </p:sldMasterIdLst>
   <p:notesMasterIdLst>
-    <p:notesMasterId r:id="rId27"/>
+    <p:notesMasterId r:id="rId28"/>
   </p:notesMasterIdLst>
   <p:sldIdLst>
     <p:sldId id="256" r:id="rId2"/>
     <p:sldId id="513" r:id="rId3"/>
-    <p:sldId id="555" r:id="rId4"/>
-    <p:sldId id="556" r:id="rId5"/>
-    <p:sldId id="630" r:id="rId6"/>
-    <p:sldId id="631" r:id="rId7"/>
-    <p:sldId id="632" r:id="rId8"/>
-    <p:sldId id="633" r:id="rId9"/>
-    <p:sldId id="623" r:id="rId10"/>
-    <p:sldId id="519" r:id="rId11"/>
-    <p:sldId id="413" r:id="rId12"/>
-    <p:sldId id="634" r:id="rId13"/>
-    <p:sldId id="635" r:id="rId14"/>
-    <p:sldId id="640" r:id="rId15"/>
-    <p:sldId id="636" r:id="rId16"/>
-    <p:sldId id="638" r:id="rId17"/>
-    <p:sldId id="637" r:id="rId18"/>
-    <p:sldId id="639" r:id="rId19"/>
-    <p:sldId id="641" r:id="rId20"/>
-    <p:sldId id="642" r:id="rId21"/>
-    <p:sldId id="372" r:id="rId22"/>
-    <p:sldId id="373" r:id="rId23"/>
-    <p:sldId id="643" r:id="rId24"/>
-    <p:sldId id="644" r:id="rId25"/>
-    <p:sldId id="645" r:id="rId26"/>
+    <p:sldId id="646" r:id="rId4"/>
+    <p:sldId id="555" r:id="rId5"/>
+    <p:sldId id="556" r:id="rId6"/>
+    <p:sldId id="630" r:id="rId7"/>
+    <p:sldId id="631" r:id="rId8"/>
+    <p:sldId id="632" r:id="rId9"/>
+    <p:sldId id="633" r:id="rId10"/>
+    <p:sldId id="623" r:id="rId11"/>
+    <p:sldId id="519" r:id="rId12"/>
+    <p:sldId id="413" r:id="rId13"/>
+    <p:sldId id="634" r:id="rId14"/>
+    <p:sldId id="635" r:id="rId15"/>
+    <p:sldId id="640" r:id="rId16"/>
+    <p:sldId id="636" r:id="rId17"/>
+    <p:sldId id="638" r:id="rId18"/>
+    <p:sldId id="637" r:id="rId19"/>
+    <p:sldId id="639" r:id="rId20"/>
+    <p:sldId id="641" r:id="rId21"/>
+    <p:sldId id="642" r:id="rId22"/>
+    <p:sldId id="372" r:id="rId23"/>
+    <p:sldId id="373" r:id="rId24"/>
+    <p:sldId id="643" r:id="rId25"/>
+    <p:sldId id="644" r:id="rId26"/>
+    <p:sldId id="645" r:id="rId27"/>
   </p:sldIdLst>
   <p:sldSz cx="12192000" cy="6858000"/>
   <p:notesSz cx="6858000" cy="9144000"/>
@@ -942,7 +943,7 @@
           <a:p>
             <a:fld id="{9CF176CD-15D1-4787-BBAA-B7F61FF9E394}" type="datetimeFigureOut">
               <a:rPr lang="en-GB" smtClean="0"/>
-              <a:t>17/03/2025</a:t>
+              <a:t>21/03/2025</a:t>
             </a:fld>
             <a:endParaRPr lang="en-GB"/>
           </a:p>
@@ -1341,7 +1342,7 @@
           <a:p>
             <a:fld id="{633AF1EE-65BA-4140-B6B9-7F82C437F84A}" type="datetimeFigureOut">
               <a:rPr lang="en-GB" smtClean="0"/>
-              <a:t>17/03/2025</a:t>
+              <a:t>21/03/2025</a:t>
             </a:fld>
             <a:endParaRPr lang="en-GB"/>
           </a:p>
@@ -1511,7 +1512,7 @@
           <a:p>
             <a:fld id="{633AF1EE-65BA-4140-B6B9-7F82C437F84A}" type="datetimeFigureOut">
               <a:rPr lang="en-GB" smtClean="0"/>
-              <a:t>17/03/2025</a:t>
+              <a:t>21/03/2025</a:t>
             </a:fld>
             <a:endParaRPr lang="en-GB"/>
           </a:p>
@@ -1691,7 +1692,7 @@
           <a:p>
             <a:fld id="{633AF1EE-65BA-4140-B6B9-7F82C437F84A}" type="datetimeFigureOut">
               <a:rPr lang="en-GB" smtClean="0"/>
-              <a:t>17/03/2025</a:t>
+              <a:t>21/03/2025</a:t>
             </a:fld>
             <a:endParaRPr lang="en-GB"/>
           </a:p>
@@ -1861,7 +1862,7 @@
           <a:p>
             <a:fld id="{633AF1EE-65BA-4140-B6B9-7F82C437F84A}" type="datetimeFigureOut">
               <a:rPr lang="en-GB" smtClean="0"/>
-              <a:t>17/03/2025</a:t>
+              <a:t>21/03/2025</a:t>
             </a:fld>
             <a:endParaRPr lang="en-GB"/>
           </a:p>
@@ -2107,7 +2108,7 @@
           <a:p>
             <a:fld id="{633AF1EE-65BA-4140-B6B9-7F82C437F84A}" type="datetimeFigureOut">
               <a:rPr lang="en-GB" smtClean="0"/>
-              <a:t>17/03/2025</a:t>
+              <a:t>21/03/2025</a:t>
             </a:fld>
             <a:endParaRPr lang="en-GB"/>
           </a:p>
@@ -2339,7 +2340,7 @@
           <a:p>
             <a:fld id="{633AF1EE-65BA-4140-B6B9-7F82C437F84A}" type="datetimeFigureOut">
               <a:rPr lang="en-GB" smtClean="0"/>
-              <a:t>17/03/2025</a:t>
+              <a:t>21/03/2025</a:t>
             </a:fld>
             <a:endParaRPr lang="en-GB"/>
           </a:p>
@@ -2706,7 +2707,7 @@
           <a:p>
             <a:fld id="{633AF1EE-65BA-4140-B6B9-7F82C437F84A}" type="datetimeFigureOut">
               <a:rPr lang="en-GB" smtClean="0"/>
-              <a:t>17/03/2025</a:t>
+              <a:t>21/03/2025</a:t>
             </a:fld>
             <a:endParaRPr lang="en-GB"/>
           </a:p>
@@ -2824,7 +2825,7 @@
           <a:p>
             <a:fld id="{633AF1EE-65BA-4140-B6B9-7F82C437F84A}" type="datetimeFigureOut">
               <a:rPr lang="en-GB" smtClean="0"/>
-              <a:t>17/03/2025</a:t>
+              <a:t>21/03/2025</a:t>
             </a:fld>
             <a:endParaRPr lang="en-GB"/>
           </a:p>
@@ -2919,7 +2920,7 @@
           <a:p>
             <a:fld id="{633AF1EE-65BA-4140-B6B9-7F82C437F84A}" type="datetimeFigureOut">
               <a:rPr lang="en-GB" smtClean="0"/>
-              <a:t>17/03/2025</a:t>
+              <a:t>21/03/2025</a:t>
             </a:fld>
             <a:endParaRPr lang="en-GB"/>
           </a:p>
@@ -3196,7 +3197,7 @@
           <a:p>
             <a:fld id="{633AF1EE-65BA-4140-B6B9-7F82C437F84A}" type="datetimeFigureOut">
               <a:rPr lang="en-GB" smtClean="0"/>
-              <a:t>17/03/2025</a:t>
+              <a:t>21/03/2025</a:t>
             </a:fld>
             <a:endParaRPr lang="en-GB"/>
           </a:p>
@@ -3449,7 +3450,7 @@
           <a:p>
             <a:fld id="{633AF1EE-65BA-4140-B6B9-7F82C437F84A}" type="datetimeFigureOut">
               <a:rPr lang="en-GB" smtClean="0"/>
-              <a:t>17/03/2025</a:t>
+              <a:t>21/03/2025</a:t>
             </a:fld>
             <a:endParaRPr lang="en-GB"/>
           </a:p>
@@ -3662,7 +3663,7 @@
           <a:p>
             <a:fld id="{633AF1EE-65BA-4140-B6B9-7F82C437F84A}" type="datetimeFigureOut">
               <a:rPr lang="en-GB" smtClean="0"/>
-              <a:t>17/03/2025</a:t>
+              <a:t>21/03/2025</a:t>
             </a:fld>
             <a:endParaRPr lang="en-GB"/>
           </a:p>
@@ -4157,6 +4158,91 @@
   <p:cSld>
     <p:spTree>
       <p:nvGrpSpPr>
+        <p:cNvPr id="1" name=""/>
+        <p:cNvGrpSpPr/>
+        <p:nvPr/>
+      </p:nvGrpSpPr>
+      <p:grpSpPr>
+        <a:xfrm>
+          <a:off x="0" y="0"/>
+          <a:ext cx="0" cy="0"/>
+          <a:chOff x="0" y="0"/>
+          <a:chExt cx="0" cy="0"/>
+        </a:xfrm>
+      </p:grpSpPr>
+      <p:sp>
+        <p:nvSpPr>
+          <p:cNvPr id="2" name="Title 1">
+            <a:extLst>
+              <a:ext uri="{FF2B5EF4-FFF2-40B4-BE49-F238E27FC236}">
+                <a16:creationId xmlns:a16="http://schemas.microsoft.com/office/drawing/2014/main" id="{CEB0F4BD-16BF-C5C2-E267-C83B8277F277}"/>
+              </a:ext>
+            </a:extLst>
+          </p:cNvPr>
+          <p:cNvSpPr>
+            <a:spLocks noGrp="1"/>
+          </p:cNvSpPr>
+          <p:nvPr>
+            <p:ph type="title"/>
+          </p:nvPr>
+        </p:nvSpPr>
+        <p:spPr/>
+        <p:txBody>
+          <a:bodyPr/>
+          <a:lstStyle/>
+          <a:p>
+            <a:endParaRPr lang="he-IL"/>
+          </a:p>
+        </p:txBody>
+      </p:sp>
+      <p:pic>
+        <p:nvPicPr>
+          <p:cNvPr id="4" name="Picture 3">
+            <a:extLst>
+              <a:ext uri="{FF2B5EF4-FFF2-40B4-BE49-F238E27FC236}">
+                <a16:creationId xmlns:a16="http://schemas.microsoft.com/office/drawing/2014/main" id="{66EBCCD1-5223-5243-2153-9783109A8558}"/>
+              </a:ext>
+            </a:extLst>
+          </p:cNvPr>
+          <p:cNvPicPr>
+            <a:picLocks noChangeAspect="1"/>
+          </p:cNvPicPr>
+          <p:nvPr/>
+        </p:nvPicPr>
+        <p:blipFill>
+          <a:blip r:embed="rId2"/>
+          <a:stretch>
+            <a:fillRect/>
+          </a:stretch>
+        </p:blipFill>
+        <p:spPr>
+          <a:xfrm>
+            <a:off x="1162319" y="0"/>
+            <a:ext cx="9867361" cy="6858000"/>
+          </a:xfrm>
+          <a:prstGeom prst="rect">
+            <a:avLst/>
+          </a:prstGeom>
+        </p:spPr>
+      </p:pic>
+    </p:spTree>
+    <p:extLst>
+      <p:ext uri="{BB962C8B-B14F-4D97-AF65-F5344CB8AC3E}">
+        <p14:creationId xmlns:p14="http://schemas.microsoft.com/office/powerpoint/2010/main" val="1758815612"/>
+      </p:ext>
+    </p:extLst>
+  </p:cSld>
+  <p:clrMapOvr>
+    <a:masterClrMapping/>
+  </p:clrMapOvr>
+</p:sld>
+</file>
+
+<file path=ppt/slides/slide11.xml><?xml version="1.0" encoding="utf-8"?>
+<p:sld xmlns:a="http://schemas.openxmlformats.org/drawingml/2006/main" xmlns:r="http://schemas.openxmlformats.org/officeDocument/2006/relationships" xmlns:p="http://schemas.openxmlformats.org/presentationml/2006/main">
+  <p:cSld>
+    <p:spTree>
+      <p:nvGrpSpPr>
         <p:cNvPr id="1" name="">
           <a:extLst>
             <a:ext uri="{FF2B5EF4-FFF2-40B4-BE49-F238E27FC236}">
@@ -4292,7 +4378,7 @@
               <a:pPr>
                 <a:defRPr/>
               </a:pPr>
-              <a:t>10</a:t>
+              <a:t>11</a:t>
             </a:fld>
             <a:r>
               <a:rPr lang="en-US" altLang="en-US"/>
@@ -4314,7 +4400,7 @@
 </p:sld>
 </file>
 
-<file path=ppt/slides/slide11.xml><?xml version="1.0" encoding="utf-8"?>
+<file path=ppt/slides/slide12.xml><?xml version="1.0" encoding="utf-8"?>
 <p:sld xmlns:a="http://schemas.openxmlformats.org/drawingml/2006/main" xmlns:r="http://schemas.openxmlformats.org/officeDocument/2006/relationships" xmlns:p="http://schemas.openxmlformats.org/presentationml/2006/main">
   <p:cSld>
     <p:spTree>
@@ -5809,7 +5895,7 @@
 </p:sld>
 </file>
 
-<file path=ppt/slides/slide12.xml><?xml version="1.0" encoding="utf-8"?>
+<file path=ppt/slides/slide13.xml><?xml version="1.0" encoding="utf-8"?>
 <p:sld xmlns:a="http://schemas.openxmlformats.org/drawingml/2006/main" xmlns:r="http://schemas.openxmlformats.org/officeDocument/2006/relationships" xmlns:p="http://schemas.openxmlformats.org/presentationml/2006/main">
   <p:cSld>
     <p:spTree>
@@ -5978,7 +6064,7 @@
 </p:sld>
 </file>
 
-<file path=ppt/slides/slide13.xml><?xml version="1.0" encoding="utf-8"?>
+<file path=ppt/slides/slide14.xml><?xml version="1.0" encoding="utf-8"?>
 <p:sld xmlns:a="http://schemas.openxmlformats.org/drawingml/2006/main" xmlns:r="http://schemas.openxmlformats.org/officeDocument/2006/relationships" xmlns:p="http://schemas.openxmlformats.org/presentationml/2006/main">
   <p:cSld>
     <p:spTree>
@@ -6129,7 +6215,7 @@
 </p:sld>
 </file>
 
-<file path=ppt/slides/slide14.xml><?xml version="1.0" encoding="utf-8"?>
+<file path=ppt/slides/slide15.xml><?xml version="1.0" encoding="utf-8"?>
 <p:sld xmlns:a="http://schemas.openxmlformats.org/drawingml/2006/main" xmlns:r="http://schemas.openxmlformats.org/officeDocument/2006/relationships" xmlns:p="http://schemas.openxmlformats.org/presentationml/2006/main">
   <p:cSld>
     <p:spTree>
@@ -6269,7 +6355,7 @@
               <a:pPr>
                 <a:defRPr/>
               </a:pPr>
-              <a:t>14</a:t>
+              <a:t>15</a:t>
             </a:fld>
             <a:r>
               <a:rPr lang="en-US" altLang="en-US"/>
@@ -6291,7 +6377,7 @@
 </p:sld>
 </file>
 
-<file path=ppt/slides/slide15.xml><?xml version="1.0" encoding="utf-8"?>
+<file path=ppt/slides/slide16.xml><?xml version="1.0" encoding="utf-8"?>
 <p:sld xmlns:a="http://schemas.openxmlformats.org/drawingml/2006/main" xmlns:r="http://schemas.openxmlformats.org/officeDocument/2006/relationships" xmlns:p="http://schemas.openxmlformats.org/presentationml/2006/main">
   <p:cSld>
     <p:spTree>
@@ -7925,7 +8011,7 @@
 </p:sld>
 </file>
 
-<file path=ppt/slides/slide16.xml><?xml version="1.0" encoding="utf-8"?>
+<file path=ppt/slides/slide17.xml><?xml version="1.0" encoding="utf-8"?>
 <p:sld xmlns:a="http://schemas.openxmlformats.org/drawingml/2006/main" xmlns:r="http://schemas.openxmlformats.org/officeDocument/2006/relationships" xmlns:p="http://schemas.openxmlformats.org/presentationml/2006/main">
   <p:cSld>
     <p:spTree>
@@ -9395,7 +9481,7 @@
 </p:sld>
 </file>
 
-<file path=ppt/slides/slide17.xml><?xml version="1.0" encoding="utf-8"?>
+<file path=ppt/slides/slide18.xml><?xml version="1.0" encoding="utf-8"?>
 <p:sld xmlns:a="http://schemas.openxmlformats.org/drawingml/2006/main" xmlns:r="http://schemas.openxmlformats.org/officeDocument/2006/relationships" xmlns:p="http://schemas.openxmlformats.org/presentationml/2006/main">
   <p:cSld>
     <p:spTree>
@@ -10463,7 +10549,7 @@
 </p:sld>
 </file>
 
-<file path=ppt/slides/slide18.xml><?xml version="1.0" encoding="utf-8"?>
+<file path=ppt/slides/slide19.xml><?xml version="1.0" encoding="utf-8"?>
 <p:sld xmlns:a="http://schemas.openxmlformats.org/drawingml/2006/main" xmlns:r="http://schemas.openxmlformats.org/officeDocument/2006/relationships" xmlns:p="http://schemas.openxmlformats.org/presentationml/2006/main">
   <p:cSld>
     <p:spTree>
@@ -10611,168 +10697,6 @@
     <p:extLst>
       <p:ext uri="{BB962C8B-B14F-4D97-AF65-F5344CB8AC3E}">
         <p14:creationId xmlns:p14="http://schemas.microsoft.com/office/powerpoint/2010/main" val="2676065333"/>
-      </p:ext>
-    </p:extLst>
-  </p:cSld>
-  <p:clrMapOvr>
-    <a:masterClrMapping/>
-  </p:clrMapOvr>
-</p:sld>
-</file>
-
-<file path=ppt/slides/slide19.xml><?xml version="1.0" encoding="utf-8"?>
-<p:sld xmlns:a="http://schemas.openxmlformats.org/drawingml/2006/main" xmlns:r="http://schemas.openxmlformats.org/officeDocument/2006/relationships" xmlns:p="http://schemas.openxmlformats.org/presentationml/2006/main">
-  <p:cSld>
-    <p:spTree>
-      <p:nvGrpSpPr>
-        <p:cNvPr id="1" name="">
-          <a:extLst>
-            <a:ext uri="{FF2B5EF4-FFF2-40B4-BE49-F238E27FC236}">
-              <a16:creationId xmlns:a16="http://schemas.microsoft.com/office/drawing/2014/main" id="{B102648E-1236-08A3-4B1B-E62F8380E874}"/>
-            </a:ext>
-          </a:extLst>
-        </p:cNvPr>
-        <p:cNvGrpSpPr/>
-        <p:nvPr/>
-      </p:nvGrpSpPr>
-      <p:grpSpPr>
-        <a:xfrm>
-          <a:off x="0" y="0"/>
-          <a:ext cx="0" cy="0"/>
-          <a:chOff x="0" y="0"/>
-          <a:chExt cx="0" cy="0"/>
-        </a:xfrm>
-      </p:grpSpPr>
-      <p:sp>
-        <p:nvSpPr>
-          <p:cNvPr id="6" name="Title 5">
-            <a:extLst>
-              <a:ext uri="{FF2B5EF4-FFF2-40B4-BE49-F238E27FC236}">
-                <a16:creationId xmlns:a16="http://schemas.microsoft.com/office/drawing/2014/main" id="{5647F60E-A44D-E41B-7644-B90F6A3EE619}"/>
-              </a:ext>
-            </a:extLst>
-          </p:cNvPr>
-          <p:cNvSpPr>
-            <a:spLocks noGrp="1"/>
-          </p:cNvSpPr>
-          <p:nvPr>
-            <p:ph type="title"/>
-          </p:nvPr>
-        </p:nvSpPr>
-        <p:spPr/>
-        <p:txBody>
-          <a:bodyPr/>
-          <a:lstStyle/>
-          <a:p>
-            <a:endParaRPr lang="en-IL"/>
-          </a:p>
-        </p:txBody>
-      </p:sp>
-      <p:sp>
-        <p:nvSpPr>
-          <p:cNvPr id="7" name="Text Placeholder 6">
-            <a:extLst>
-              <a:ext uri="{FF2B5EF4-FFF2-40B4-BE49-F238E27FC236}">
-                <a16:creationId xmlns:a16="http://schemas.microsoft.com/office/drawing/2014/main" id="{1E6BB36C-5A95-618D-2846-848269E996D1}"/>
-              </a:ext>
-            </a:extLst>
-          </p:cNvPr>
-          <p:cNvSpPr>
-            <a:spLocks noGrp="1"/>
-          </p:cNvSpPr>
-          <p:nvPr>
-            <p:ph type="body" idx="1"/>
-          </p:nvPr>
-        </p:nvSpPr>
-        <p:spPr/>
-        <p:txBody>
-          <a:bodyPr>
-            <a:normAutofit/>
-          </a:bodyPr>
-          <a:lstStyle/>
-          <a:p>
-            <a:pPr algn="ctr"/>
-            <a:r>
-              <a:rPr lang="en-US" sz="7200" dirty="0"/>
-              <a:t>5D The typical set</a:t>
-            </a:r>
-            <a:endParaRPr lang="en-IL" sz="7200" dirty="0"/>
-          </a:p>
-        </p:txBody>
-      </p:sp>
-      <p:sp>
-        <p:nvSpPr>
-          <p:cNvPr id="4" name="Footer Placeholder 3">
-            <a:extLst>
-              <a:ext uri="{FF2B5EF4-FFF2-40B4-BE49-F238E27FC236}">
-                <a16:creationId xmlns:a16="http://schemas.microsoft.com/office/drawing/2014/main" id="{956C295F-1628-C988-4865-19CF9B8B1363}"/>
-              </a:ext>
-            </a:extLst>
-          </p:cNvPr>
-          <p:cNvSpPr>
-            <a:spLocks noGrp="1"/>
-          </p:cNvSpPr>
-          <p:nvPr>
-            <p:ph type="ftr" sz="quarter" idx="11"/>
-          </p:nvPr>
-        </p:nvSpPr>
-        <p:spPr/>
-        <p:txBody>
-          <a:bodyPr/>
-          <a:lstStyle/>
-          <a:p>
-            <a:pPr>
-              <a:defRPr/>
-            </a:pPr>
-            <a:r>
-              <a:rPr lang="en-US"/>
-              <a:t>Data analysis, 2022-1, Lecture 1</a:t>
-            </a:r>
-          </a:p>
-        </p:txBody>
-      </p:sp>
-      <p:sp>
-        <p:nvSpPr>
-          <p:cNvPr id="5" name="Slide Number Placeholder 4">
-            <a:extLst>
-              <a:ext uri="{FF2B5EF4-FFF2-40B4-BE49-F238E27FC236}">
-                <a16:creationId xmlns:a16="http://schemas.microsoft.com/office/drawing/2014/main" id="{54F74F3C-4B74-6C11-5D94-D0B44C3150E4}"/>
-              </a:ext>
-            </a:extLst>
-          </p:cNvPr>
-          <p:cNvSpPr>
-            <a:spLocks noGrp="1"/>
-          </p:cNvSpPr>
-          <p:nvPr>
-            <p:ph type="sldNum" sz="quarter" idx="12"/>
-          </p:nvPr>
-        </p:nvSpPr>
-        <p:spPr/>
-        <p:txBody>
-          <a:bodyPr/>
-          <a:lstStyle/>
-          <a:p>
-            <a:pPr>
-              <a:defRPr/>
-            </a:pPr>
-            <a:fld id="{3469EAC8-EFAD-49DA-A425-6225312A328A}" type="slidenum">
-              <a:rPr lang="he-IL" altLang="en-US" smtClean="0"/>
-              <a:pPr>
-                <a:defRPr/>
-              </a:pPr>
-              <a:t>19</a:t>
-            </a:fld>
-            <a:r>
-              <a:rPr lang="en-US" altLang="en-US"/>
-              <a:t> /  72</a:t>
-            </a:r>
-          </a:p>
-        </p:txBody>
-      </p:sp>
-    </p:spTree>
-    <p:extLst>
-      <p:ext uri="{BB962C8B-B14F-4D97-AF65-F5344CB8AC3E}">
-        <p14:creationId xmlns:p14="http://schemas.microsoft.com/office/powerpoint/2010/main" val="1154589309"/>
       </p:ext>
     </p:extLst>
   </p:cSld>
@@ -10943,6 +10867,168 @@
 </file>
 
 <file path=ppt/slides/slide20.xml><?xml version="1.0" encoding="utf-8"?>
+<p:sld xmlns:a="http://schemas.openxmlformats.org/drawingml/2006/main" xmlns:r="http://schemas.openxmlformats.org/officeDocument/2006/relationships" xmlns:p="http://schemas.openxmlformats.org/presentationml/2006/main">
+  <p:cSld>
+    <p:spTree>
+      <p:nvGrpSpPr>
+        <p:cNvPr id="1" name="">
+          <a:extLst>
+            <a:ext uri="{FF2B5EF4-FFF2-40B4-BE49-F238E27FC236}">
+              <a16:creationId xmlns:a16="http://schemas.microsoft.com/office/drawing/2014/main" id="{B102648E-1236-08A3-4B1B-E62F8380E874}"/>
+            </a:ext>
+          </a:extLst>
+        </p:cNvPr>
+        <p:cNvGrpSpPr/>
+        <p:nvPr/>
+      </p:nvGrpSpPr>
+      <p:grpSpPr>
+        <a:xfrm>
+          <a:off x="0" y="0"/>
+          <a:ext cx="0" cy="0"/>
+          <a:chOff x="0" y="0"/>
+          <a:chExt cx="0" cy="0"/>
+        </a:xfrm>
+      </p:grpSpPr>
+      <p:sp>
+        <p:nvSpPr>
+          <p:cNvPr id="6" name="Title 5">
+            <a:extLst>
+              <a:ext uri="{FF2B5EF4-FFF2-40B4-BE49-F238E27FC236}">
+                <a16:creationId xmlns:a16="http://schemas.microsoft.com/office/drawing/2014/main" id="{5647F60E-A44D-E41B-7644-B90F6A3EE619}"/>
+              </a:ext>
+            </a:extLst>
+          </p:cNvPr>
+          <p:cNvSpPr>
+            <a:spLocks noGrp="1"/>
+          </p:cNvSpPr>
+          <p:nvPr>
+            <p:ph type="title"/>
+          </p:nvPr>
+        </p:nvSpPr>
+        <p:spPr/>
+        <p:txBody>
+          <a:bodyPr/>
+          <a:lstStyle/>
+          <a:p>
+            <a:endParaRPr lang="en-IL"/>
+          </a:p>
+        </p:txBody>
+      </p:sp>
+      <p:sp>
+        <p:nvSpPr>
+          <p:cNvPr id="7" name="Text Placeholder 6">
+            <a:extLst>
+              <a:ext uri="{FF2B5EF4-FFF2-40B4-BE49-F238E27FC236}">
+                <a16:creationId xmlns:a16="http://schemas.microsoft.com/office/drawing/2014/main" id="{1E6BB36C-5A95-618D-2846-848269E996D1}"/>
+              </a:ext>
+            </a:extLst>
+          </p:cNvPr>
+          <p:cNvSpPr>
+            <a:spLocks noGrp="1"/>
+          </p:cNvSpPr>
+          <p:nvPr>
+            <p:ph type="body" idx="1"/>
+          </p:nvPr>
+        </p:nvSpPr>
+        <p:spPr/>
+        <p:txBody>
+          <a:bodyPr>
+            <a:normAutofit/>
+          </a:bodyPr>
+          <a:lstStyle/>
+          <a:p>
+            <a:pPr algn="ctr"/>
+            <a:r>
+              <a:rPr lang="en-US" sz="7200" dirty="0"/>
+              <a:t>5D The typical set</a:t>
+            </a:r>
+            <a:endParaRPr lang="en-IL" sz="7200" dirty="0"/>
+          </a:p>
+        </p:txBody>
+      </p:sp>
+      <p:sp>
+        <p:nvSpPr>
+          <p:cNvPr id="4" name="Footer Placeholder 3">
+            <a:extLst>
+              <a:ext uri="{FF2B5EF4-FFF2-40B4-BE49-F238E27FC236}">
+                <a16:creationId xmlns:a16="http://schemas.microsoft.com/office/drawing/2014/main" id="{956C295F-1628-C988-4865-19CF9B8B1363}"/>
+              </a:ext>
+            </a:extLst>
+          </p:cNvPr>
+          <p:cNvSpPr>
+            <a:spLocks noGrp="1"/>
+          </p:cNvSpPr>
+          <p:nvPr>
+            <p:ph type="ftr" sz="quarter" idx="11"/>
+          </p:nvPr>
+        </p:nvSpPr>
+        <p:spPr/>
+        <p:txBody>
+          <a:bodyPr/>
+          <a:lstStyle/>
+          <a:p>
+            <a:pPr>
+              <a:defRPr/>
+            </a:pPr>
+            <a:r>
+              <a:rPr lang="en-US"/>
+              <a:t>Data analysis, 2022-1, Lecture 1</a:t>
+            </a:r>
+          </a:p>
+        </p:txBody>
+      </p:sp>
+      <p:sp>
+        <p:nvSpPr>
+          <p:cNvPr id="5" name="Slide Number Placeholder 4">
+            <a:extLst>
+              <a:ext uri="{FF2B5EF4-FFF2-40B4-BE49-F238E27FC236}">
+                <a16:creationId xmlns:a16="http://schemas.microsoft.com/office/drawing/2014/main" id="{54F74F3C-4B74-6C11-5D94-D0B44C3150E4}"/>
+              </a:ext>
+            </a:extLst>
+          </p:cNvPr>
+          <p:cNvSpPr>
+            <a:spLocks noGrp="1"/>
+          </p:cNvSpPr>
+          <p:nvPr>
+            <p:ph type="sldNum" sz="quarter" idx="12"/>
+          </p:nvPr>
+        </p:nvSpPr>
+        <p:spPr/>
+        <p:txBody>
+          <a:bodyPr/>
+          <a:lstStyle/>
+          <a:p>
+            <a:pPr>
+              <a:defRPr/>
+            </a:pPr>
+            <a:fld id="{3469EAC8-EFAD-49DA-A425-6225312A328A}" type="slidenum">
+              <a:rPr lang="he-IL" altLang="en-US" smtClean="0"/>
+              <a:pPr>
+                <a:defRPr/>
+              </a:pPr>
+              <a:t>20</a:t>
+            </a:fld>
+            <a:r>
+              <a:rPr lang="en-US" altLang="en-US"/>
+              <a:t> /  72</a:t>
+            </a:r>
+          </a:p>
+        </p:txBody>
+      </p:sp>
+    </p:spTree>
+    <p:extLst>
+      <p:ext uri="{BB962C8B-B14F-4D97-AF65-F5344CB8AC3E}">
+        <p14:creationId xmlns:p14="http://schemas.microsoft.com/office/powerpoint/2010/main" val="1154589309"/>
+      </p:ext>
+    </p:extLst>
+  </p:cSld>
+  <p:clrMapOvr>
+    <a:masterClrMapping/>
+  </p:clrMapOvr>
+</p:sld>
+</file>
+
+<file path=ppt/slides/slide21.xml><?xml version="1.0" encoding="utf-8"?>
 <p:sld xmlns:a="http://schemas.openxmlformats.org/drawingml/2006/main" xmlns:r="http://schemas.openxmlformats.org/officeDocument/2006/relationships" xmlns:p="http://schemas.openxmlformats.org/presentationml/2006/main">
   <p:cSld>
     <p:spTree>
@@ -12141,7 +12227,7 @@
 </p:sld>
 </file>
 
-<file path=ppt/slides/slide21.xml><?xml version="1.0" encoding="utf-8"?>
+<file path=ppt/slides/slide22.xml><?xml version="1.0" encoding="utf-8"?>
 <p:sld xmlns:a="http://schemas.openxmlformats.org/drawingml/2006/main" xmlns:r="http://schemas.openxmlformats.org/officeDocument/2006/relationships" xmlns:p="http://schemas.openxmlformats.org/presentationml/2006/main">
   <p:cSld>
     <p:spTree>
@@ -12514,7 +12600,7 @@
 </p:sld>
 </file>
 
-<file path=ppt/slides/slide22.xml><?xml version="1.0" encoding="utf-8"?>
+<file path=ppt/slides/slide23.xml><?xml version="1.0" encoding="utf-8"?>
 <p:sld xmlns:a="http://schemas.openxmlformats.org/drawingml/2006/main" xmlns:r="http://schemas.openxmlformats.org/officeDocument/2006/relationships" xmlns:p="http://schemas.openxmlformats.org/presentationml/2006/main">
   <p:cSld>
     <p:spTree>
@@ -12667,7 +12753,7 @@
 </p:sld>
 </file>
 
-<file path=ppt/slides/slide23.xml><?xml version="1.0" encoding="utf-8"?>
+<file path=ppt/slides/slide24.xml><?xml version="1.0" encoding="utf-8"?>
 <p:sld xmlns:a="http://schemas.openxmlformats.org/drawingml/2006/main" xmlns:r="http://schemas.openxmlformats.org/officeDocument/2006/relationships" xmlns:p="http://schemas.openxmlformats.org/presentationml/2006/main">
   <p:cSld>
     <p:spTree>
@@ -12885,7 +12971,7 @@
 </p:sld>
 </file>
 
-<file path=ppt/slides/slide24.xml><?xml version="1.0" encoding="utf-8"?>
+<file path=ppt/slides/slide25.xml><?xml version="1.0" encoding="utf-8"?>
 <p:sld xmlns:a="http://schemas.openxmlformats.org/drawingml/2006/main" xmlns:r="http://schemas.openxmlformats.org/officeDocument/2006/relationships" xmlns:p="http://schemas.openxmlformats.org/presentationml/2006/main">
   <p:cSld>
     <p:spTree>
@@ -13025,7 +13111,7 @@
               <a:pPr>
                 <a:defRPr/>
               </a:pPr>
-              <a:t>24</a:t>
+              <a:t>25</a:t>
             </a:fld>
             <a:r>
               <a:rPr lang="en-US" altLang="en-US"/>
@@ -13047,7 +13133,7 @@
 </p:sld>
 </file>
 
-<file path=ppt/slides/slide25.xml><?xml version="1.0" encoding="utf-8"?>
+<file path=ppt/slides/slide26.xml><?xml version="1.0" encoding="utf-8"?>
 <p:sld xmlns:a="http://schemas.openxmlformats.org/drawingml/2006/main" xmlns:r="http://schemas.openxmlformats.org/officeDocument/2006/relationships" xmlns:p="http://schemas.openxmlformats.org/presentationml/2006/main">
   <p:cSld>
     <p:spTree>
@@ -13150,6 +13236,170 @@
 </file>
 
 <file path=ppt/slides/slide3.xml><?xml version="1.0" encoding="utf-8"?>
+<p:sld xmlns:a="http://schemas.openxmlformats.org/drawingml/2006/main" xmlns:r="http://schemas.openxmlformats.org/officeDocument/2006/relationships" xmlns:p="http://schemas.openxmlformats.org/presentationml/2006/main">
+  <p:cSld>
+    <p:spTree>
+      <p:nvGrpSpPr>
+        <p:cNvPr id="1" name="">
+          <a:extLst>
+            <a:ext uri="{FF2B5EF4-FFF2-40B4-BE49-F238E27FC236}">
+              <a16:creationId xmlns:a16="http://schemas.microsoft.com/office/drawing/2014/main" id="{4665CDA2-C13A-9081-F852-E85D7414F712}"/>
+            </a:ext>
+          </a:extLst>
+        </p:cNvPr>
+        <p:cNvGrpSpPr/>
+        <p:nvPr/>
+      </p:nvGrpSpPr>
+      <p:grpSpPr>
+        <a:xfrm>
+          <a:off x="0" y="0"/>
+          <a:ext cx="0" cy="0"/>
+          <a:chOff x="0" y="0"/>
+          <a:chExt cx="0" cy="0"/>
+        </a:xfrm>
+      </p:grpSpPr>
+      <p:sp>
+        <p:nvSpPr>
+          <p:cNvPr id="2" name="Title 1">
+            <a:extLst>
+              <a:ext uri="{FF2B5EF4-FFF2-40B4-BE49-F238E27FC236}">
+                <a16:creationId xmlns:a16="http://schemas.microsoft.com/office/drawing/2014/main" id="{4558EE1B-1EF3-DE2D-2777-A4BE582F5127}"/>
+              </a:ext>
+            </a:extLst>
+          </p:cNvPr>
+          <p:cNvSpPr>
+            <a:spLocks noGrp="1"/>
+          </p:cNvSpPr>
+          <p:nvPr>
+            <p:ph type="title"/>
+          </p:nvPr>
+        </p:nvSpPr>
+        <p:spPr>
+          <a:xfrm>
+            <a:off x="838200" y="365125"/>
+            <a:ext cx="10515600" cy="462189"/>
+          </a:xfrm>
+        </p:spPr>
+        <p:txBody>
+          <a:bodyPr>
+            <a:normAutofit fontScale="90000"/>
+          </a:bodyPr>
+          <a:lstStyle/>
+          <a:p>
+            <a:br>
+              <a:rPr lang="en-US" dirty="0"/>
+            </a:br>
+            <a:r>
+              <a:rPr lang="en-US" dirty="0"/>
+              <a:t>Bayesian workflow</a:t>
+            </a:r>
+            <a:endParaRPr lang="en-IL" dirty="0"/>
+          </a:p>
+        </p:txBody>
+      </p:sp>
+      <p:sp>
+        <p:nvSpPr>
+          <p:cNvPr id="6" name="Content Placeholder 5">
+            <a:extLst>
+              <a:ext uri="{FF2B5EF4-FFF2-40B4-BE49-F238E27FC236}">
+                <a16:creationId xmlns:a16="http://schemas.microsoft.com/office/drawing/2014/main" id="{DC4DC64D-45B5-2E26-04C7-B8AB1FB973E9}"/>
+              </a:ext>
+            </a:extLst>
+          </p:cNvPr>
+          <p:cNvSpPr>
+            <a:spLocks noGrp="1"/>
+          </p:cNvSpPr>
+          <p:nvPr>
+            <p:ph idx="1"/>
+          </p:nvPr>
+        </p:nvSpPr>
+        <p:spPr>
+          <a:xfrm>
+            <a:off x="838200" y="1825625"/>
+            <a:ext cx="10515600" cy="909819"/>
+          </a:xfrm>
+        </p:spPr>
+        <p:txBody>
+          <a:bodyPr>
+            <a:normAutofit fontScale="55000" lnSpcReduction="20000"/>
+          </a:bodyPr>
+          <a:lstStyle/>
+          <a:p>
+            <a:pPr>
+              <a:buFont typeface="Arial" panose="020B0604020202020204" pitchFamily="34" charset="0"/>
+              <a:buChar char="•"/>
+            </a:pPr>
+            <a:r>
+              <a:rPr lang="en-US" dirty="0"/>
+              <a:t>Bayesian workflow guides data analysis from start to finish.</a:t>
+            </a:r>
+          </a:p>
+          <a:p>
+            <a:pPr>
+              <a:buFont typeface="Arial" panose="020B0604020202020204" pitchFamily="34" charset="0"/>
+              <a:buChar char="•"/>
+            </a:pPr>
+            <a:r>
+              <a:rPr lang="en-US" dirty="0"/>
+              <a:t>Each step influences modeling decisions and inference.</a:t>
+            </a:r>
+          </a:p>
+          <a:p>
+            <a:pPr>
+              <a:buFont typeface="Arial" panose="020B0604020202020204" pitchFamily="34" charset="0"/>
+              <a:buChar char="•"/>
+            </a:pPr>
+            <a:r>
+              <a:rPr lang="en-US" dirty="0"/>
+              <a:t>Each step has its own tools n</a:t>
+            </a:r>
+          </a:p>
+        </p:txBody>
+      </p:sp>
+      <p:pic>
+        <p:nvPicPr>
+          <p:cNvPr id="16" name="Picture 15">
+            <a:extLst>
+              <a:ext uri="{FF2B5EF4-FFF2-40B4-BE49-F238E27FC236}">
+                <a16:creationId xmlns:a16="http://schemas.microsoft.com/office/drawing/2014/main" id="{1FD11B4C-8E6C-5F52-8A3A-A52B3523A24A}"/>
+              </a:ext>
+            </a:extLst>
+          </p:cNvPr>
+          <p:cNvPicPr>
+            <a:picLocks noChangeAspect="1"/>
+          </p:cNvPicPr>
+          <p:nvPr/>
+        </p:nvPicPr>
+        <p:blipFill>
+          <a:blip r:embed="rId2"/>
+          <a:stretch>
+            <a:fillRect/>
+          </a:stretch>
+        </p:blipFill>
+        <p:spPr>
+          <a:xfrm>
+            <a:off x="519680" y="3164945"/>
+            <a:ext cx="9734663" cy="3419857"/>
+          </a:xfrm>
+          <a:prstGeom prst="rect">
+            <a:avLst/>
+          </a:prstGeom>
+        </p:spPr>
+      </p:pic>
+    </p:spTree>
+    <p:extLst>
+      <p:ext uri="{BB962C8B-B14F-4D97-AF65-F5344CB8AC3E}">
+        <p14:creationId xmlns:p14="http://schemas.microsoft.com/office/powerpoint/2010/main" val="2670803438"/>
+      </p:ext>
+    </p:extLst>
+  </p:cSld>
+  <p:clrMapOvr>
+    <a:masterClrMapping/>
+  </p:clrMapOvr>
+</p:sld>
+</file>
+
+<file path=ppt/slides/slide4.xml><?xml version="1.0" encoding="utf-8"?>
 <p:sld xmlns:a="http://schemas.openxmlformats.org/drawingml/2006/main" xmlns:r="http://schemas.openxmlformats.org/officeDocument/2006/relationships" xmlns:p="http://schemas.openxmlformats.org/presentationml/2006/main">
   <p:cSld>
     <p:spTree>
@@ -13347,7 +13597,7 @@
 </p:sld>
 </file>
 
-<file path=ppt/slides/slide4.xml><?xml version="1.0" encoding="utf-8"?>
+<file path=ppt/slides/slide5.xml><?xml version="1.0" encoding="utf-8"?>
 <p:sld xmlns:a="http://schemas.openxmlformats.org/drawingml/2006/main" xmlns:r="http://schemas.openxmlformats.org/officeDocument/2006/relationships" xmlns:p="http://schemas.openxmlformats.org/presentationml/2006/main">
   <p:cSld>
     <p:spTree>
@@ -13550,7 +13800,7 @@
 </p:sld>
 </file>
 
-<file path=ppt/slides/slide5.xml><?xml version="1.0" encoding="utf-8"?>
+<file path=ppt/slides/slide6.xml><?xml version="1.0" encoding="utf-8"?>
 <p:sld xmlns:a="http://schemas.openxmlformats.org/drawingml/2006/main" xmlns:r="http://schemas.openxmlformats.org/officeDocument/2006/relationships" xmlns:p="http://schemas.openxmlformats.org/presentationml/2006/main">
   <p:cSld>
     <p:spTree>
@@ -13745,7 +13995,7 @@
 </p:sld>
 </file>
 
-<file path=ppt/slides/slide6.xml><?xml version="1.0" encoding="utf-8"?>
+<file path=ppt/slides/slide7.xml><?xml version="1.0" encoding="utf-8"?>
 <p:sld xmlns:a="http://schemas.openxmlformats.org/drawingml/2006/main" xmlns:r="http://schemas.openxmlformats.org/officeDocument/2006/relationships" xmlns:p="http://schemas.openxmlformats.org/presentationml/2006/main">
   <p:cSld>
     <p:spTree>
@@ -15248,7 +15498,7 @@
 </p:sld>
 </file>
 
-<file path=ppt/slides/slide7.xml><?xml version="1.0" encoding="utf-8"?>
+<file path=ppt/slides/slide8.xml><?xml version="1.0" encoding="utf-8"?>
 <p:sld xmlns:a="http://schemas.openxmlformats.org/drawingml/2006/main" xmlns:r="http://schemas.openxmlformats.org/officeDocument/2006/relationships" xmlns:p="http://schemas.openxmlformats.org/presentationml/2006/main">
   <p:cSld>
     <p:spTree>
@@ -15407,7 +15657,7 @@
 </p:sld>
 </file>
 
-<file path=ppt/slides/slide8.xml><?xml version="1.0" encoding="utf-8"?>
+<file path=ppt/slides/slide9.xml><?xml version="1.0" encoding="utf-8"?>
 <p:sld xmlns:a="http://schemas.openxmlformats.org/drawingml/2006/main" xmlns:r="http://schemas.openxmlformats.org/officeDocument/2006/relationships" xmlns:p="http://schemas.openxmlformats.org/presentationml/2006/main">
   <p:cSld>
     <p:spTree>
@@ -15535,91 +15785,6 @@
     <p:extLst>
       <p:ext uri="{BB962C8B-B14F-4D97-AF65-F5344CB8AC3E}">
         <p14:creationId xmlns:p14="http://schemas.microsoft.com/office/powerpoint/2010/main" val="4016360341"/>
-      </p:ext>
-    </p:extLst>
-  </p:cSld>
-  <p:clrMapOvr>
-    <a:masterClrMapping/>
-  </p:clrMapOvr>
-</p:sld>
-</file>
-
-<file path=ppt/slides/slide9.xml><?xml version="1.0" encoding="utf-8"?>
-<p:sld xmlns:a="http://schemas.openxmlformats.org/drawingml/2006/main" xmlns:r="http://schemas.openxmlformats.org/officeDocument/2006/relationships" xmlns:p="http://schemas.openxmlformats.org/presentationml/2006/main">
-  <p:cSld>
-    <p:spTree>
-      <p:nvGrpSpPr>
-        <p:cNvPr id="1" name=""/>
-        <p:cNvGrpSpPr/>
-        <p:nvPr/>
-      </p:nvGrpSpPr>
-      <p:grpSpPr>
-        <a:xfrm>
-          <a:off x="0" y="0"/>
-          <a:ext cx="0" cy="0"/>
-          <a:chOff x="0" y="0"/>
-          <a:chExt cx="0" cy="0"/>
-        </a:xfrm>
-      </p:grpSpPr>
-      <p:sp>
-        <p:nvSpPr>
-          <p:cNvPr id="2" name="Title 1">
-            <a:extLst>
-              <a:ext uri="{FF2B5EF4-FFF2-40B4-BE49-F238E27FC236}">
-                <a16:creationId xmlns:a16="http://schemas.microsoft.com/office/drawing/2014/main" id="{CEB0F4BD-16BF-C5C2-E267-C83B8277F277}"/>
-              </a:ext>
-            </a:extLst>
-          </p:cNvPr>
-          <p:cNvSpPr>
-            <a:spLocks noGrp="1"/>
-          </p:cNvSpPr>
-          <p:nvPr>
-            <p:ph type="title"/>
-          </p:nvPr>
-        </p:nvSpPr>
-        <p:spPr/>
-        <p:txBody>
-          <a:bodyPr/>
-          <a:lstStyle/>
-          <a:p>
-            <a:endParaRPr lang="he-IL"/>
-          </a:p>
-        </p:txBody>
-      </p:sp>
-      <p:pic>
-        <p:nvPicPr>
-          <p:cNvPr id="4" name="Picture 3">
-            <a:extLst>
-              <a:ext uri="{FF2B5EF4-FFF2-40B4-BE49-F238E27FC236}">
-                <a16:creationId xmlns:a16="http://schemas.microsoft.com/office/drawing/2014/main" id="{66EBCCD1-5223-5243-2153-9783109A8558}"/>
-              </a:ext>
-            </a:extLst>
-          </p:cNvPr>
-          <p:cNvPicPr>
-            <a:picLocks noChangeAspect="1"/>
-          </p:cNvPicPr>
-          <p:nvPr/>
-        </p:nvPicPr>
-        <p:blipFill>
-          <a:blip r:embed="rId2"/>
-          <a:stretch>
-            <a:fillRect/>
-          </a:stretch>
-        </p:blipFill>
-        <p:spPr>
-          <a:xfrm>
-            <a:off x="1162319" y="0"/>
-            <a:ext cx="9867361" cy="6858000"/>
-          </a:xfrm>
-          <a:prstGeom prst="rect">
-            <a:avLst/>
-          </a:prstGeom>
-        </p:spPr>
-      </p:pic>
-    </p:spTree>
-    <p:extLst>
-      <p:ext uri="{BB962C8B-B14F-4D97-AF65-F5344CB8AC3E}">
-        <p14:creationId xmlns:p14="http://schemas.microsoft.com/office/powerpoint/2010/main" val="1758815612"/>
       </p:ext>
     </p:extLst>
   </p:cSld>

</xml_diff>